<commit_message>
upload CRUD and merged dataframes
</commit_message>
<xml_diff>
--- a/HTML_Template_Layout.pptx
+++ b/HTML_Template_Layout.pptx
@@ -259,7 +259,7 @@
           <a:p>
             <a:fld id="{63DC7F28-6D27-4823-A893-0495A6460885}" type="datetimeFigureOut">
               <a:rPr lang="en-US" smtClean="0"/>
-              <a:t>9/19/2019</a:t>
+              <a:t>9/21/2019</a:t>
             </a:fld>
             <a:endParaRPr lang="en-US"/>
           </a:p>
@@ -457,7 +457,7 @@
           <a:p>
             <a:fld id="{63DC7F28-6D27-4823-A893-0495A6460885}" type="datetimeFigureOut">
               <a:rPr lang="en-US" smtClean="0"/>
-              <a:t>9/19/2019</a:t>
+              <a:t>9/21/2019</a:t>
             </a:fld>
             <a:endParaRPr lang="en-US"/>
           </a:p>
@@ -665,7 +665,7 @@
           <a:p>
             <a:fld id="{63DC7F28-6D27-4823-A893-0495A6460885}" type="datetimeFigureOut">
               <a:rPr lang="en-US" smtClean="0"/>
-              <a:t>9/19/2019</a:t>
+              <a:t>9/21/2019</a:t>
             </a:fld>
             <a:endParaRPr lang="en-US"/>
           </a:p>
@@ -863,7 +863,7 @@
           <a:p>
             <a:fld id="{63DC7F28-6D27-4823-A893-0495A6460885}" type="datetimeFigureOut">
               <a:rPr lang="en-US" smtClean="0"/>
-              <a:t>9/19/2019</a:t>
+              <a:t>9/21/2019</a:t>
             </a:fld>
             <a:endParaRPr lang="en-US"/>
           </a:p>
@@ -1138,7 +1138,7 @@
           <a:p>
             <a:fld id="{63DC7F28-6D27-4823-A893-0495A6460885}" type="datetimeFigureOut">
               <a:rPr lang="en-US" smtClean="0"/>
-              <a:t>9/19/2019</a:t>
+              <a:t>9/21/2019</a:t>
             </a:fld>
             <a:endParaRPr lang="en-US"/>
           </a:p>
@@ -1403,7 +1403,7 @@
           <a:p>
             <a:fld id="{63DC7F28-6D27-4823-A893-0495A6460885}" type="datetimeFigureOut">
               <a:rPr lang="en-US" smtClean="0"/>
-              <a:t>9/19/2019</a:t>
+              <a:t>9/21/2019</a:t>
             </a:fld>
             <a:endParaRPr lang="en-US"/>
           </a:p>
@@ -1815,7 +1815,7 @@
           <a:p>
             <a:fld id="{63DC7F28-6D27-4823-A893-0495A6460885}" type="datetimeFigureOut">
               <a:rPr lang="en-US" smtClean="0"/>
-              <a:t>9/19/2019</a:t>
+              <a:t>9/21/2019</a:t>
             </a:fld>
             <a:endParaRPr lang="en-US"/>
           </a:p>
@@ -1956,7 +1956,7 @@
           <a:p>
             <a:fld id="{63DC7F28-6D27-4823-A893-0495A6460885}" type="datetimeFigureOut">
               <a:rPr lang="en-US" smtClean="0"/>
-              <a:t>9/19/2019</a:t>
+              <a:t>9/21/2019</a:t>
             </a:fld>
             <a:endParaRPr lang="en-US"/>
           </a:p>
@@ -2069,7 +2069,7 @@
           <a:p>
             <a:fld id="{63DC7F28-6D27-4823-A893-0495A6460885}" type="datetimeFigureOut">
               <a:rPr lang="en-US" smtClean="0"/>
-              <a:t>9/19/2019</a:t>
+              <a:t>9/21/2019</a:t>
             </a:fld>
             <a:endParaRPr lang="en-US"/>
           </a:p>
@@ -2380,7 +2380,7 @@
           <a:p>
             <a:fld id="{63DC7F28-6D27-4823-A893-0495A6460885}" type="datetimeFigureOut">
               <a:rPr lang="en-US" smtClean="0"/>
-              <a:t>9/19/2019</a:t>
+              <a:t>9/21/2019</a:t>
             </a:fld>
             <a:endParaRPr lang="en-US"/>
           </a:p>
@@ -2668,7 +2668,7 @@
           <a:p>
             <a:fld id="{63DC7F28-6D27-4823-A893-0495A6460885}" type="datetimeFigureOut">
               <a:rPr lang="en-US" smtClean="0"/>
-              <a:t>9/19/2019</a:t>
+              <a:t>9/21/2019</a:t>
             </a:fld>
             <a:endParaRPr lang="en-US"/>
           </a:p>
@@ -2909,7 +2909,7 @@
           <a:p>
             <a:fld id="{63DC7F28-6D27-4823-A893-0495A6460885}" type="datetimeFigureOut">
               <a:rPr lang="en-US" smtClean="0"/>
-              <a:t>9/19/2019</a:t>
+              <a:t>9/21/2019</a:t>
             </a:fld>
             <a:endParaRPr lang="en-US"/>
           </a:p>
@@ -3405,6 +3405,18 @@
               <a:t>Global Map Medal (using Leaflet)</a:t>
             </a:r>
           </a:p>
+          <a:p>
+            <a:r>
+              <a:rPr lang="en-US" dirty="0">
+                <a:hlinkClick r:id="rId2"/>
+              </a:rPr>
+              <a:t>https://docs.mapbox.com/help/tutorials/show-changes-over-time/</a:t>
+            </a:r>
+            <a:endParaRPr lang="en-US" dirty="0"/>
+          </a:p>
+          <a:p>
+            <a:endParaRPr lang="en-US" dirty="0"/>
+          </a:p>
         </p:txBody>
       </p:sp>
       <p:sp>
@@ -3468,52 +3480,6 @@
       </p:sp>
       <p:sp>
         <p:nvSpPr>
-          <p:cNvPr id="5" name="Rectangle 4">
-            <a:extLst>
-              <a:ext uri="{FF2B5EF4-FFF2-40B4-BE49-F238E27FC236}">
-                <a16:creationId xmlns:a16="http://schemas.microsoft.com/office/drawing/2014/main" id="{8BE882CA-938B-46BC-822C-71FD1B443801}"/>
-              </a:ext>
-            </a:extLst>
-          </p:cNvPr>
-          <p:cNvSpPr/>
-          <p:nvPr/>
-        </p:nvSpPr>
-        <p:spPr>
-          <a:xfrm>
-            <a:off x="6284743" y="1387427"/>
-            <a:ext cx="45719" cy="45719"/>
-          </a:xfrm>
-          <a:prstGeom prst="rect">
-            <a:avLst/>
-          </a:prstGeom>
-        </p:spPr>
-        <p:style>
-          <a:lnRef idx="2">
-            <a:schemeClr val="accent1">
-              <a:shade val="50000"/>
-            </a:schemeClr>
-          </a:lnRef>
-          <a:fillRef idx="1">
-            <a:schemeClr val="accent1"/>
-          </a:fillRef>
-          <a:effectRef idx="0">
-            <a:schemeClr val="accent1"/>
-          </a:effectRef>
-          <a:fontRef idx="minor">
-            <a:schemeClr val="lt1"/>
-          </a:fontRef>
-        </p:style>
-        <p:txBody>
-          <a:bodyPr rtlCol="0" anchor="ctr"/>
-          <a:lstStyle/>
-          <a:p>
-            <a:pPr algn="ctr"/>
-            <a:endParaRPr lang="en-US"/>
-          </a:p>
-        </p:txBody>
-      </p:sp>
-      <p:sp>
-        <p:nvSpPr>
           <p:cNvPr id="6" name="Title 1">
             <a:extLst>
               <a:ext uri="{FF2B5EF4-FFF2-40B4-BE49-F238E27FC236}">
@@ -3565,8 +3531,8 @@
           </a:lstStyle>
           <a:p>
             <a:r>
-              <a:rPr lang="en-US" sz="1800" dirty="0"/>
-              <a:t>Global Map Year Transition Mouse Event Slider (to increase/ decrease year)</a:t>
+              <a:rPr lang="en-US" sz="1200" dirty="0"/>
+              <a:t>Global Map Year Transition Mouse Event Slider (to increase/ decrease year), Dropdown for Summer, Winter Olympics, Medal Icon</a:t>
             </a:r>
           </a:p>
         </p:txBody>
@@ -4098,6 +4064,48 @@
             </a:r>
           </a:p>
           <a:p>
+            <a:endParaRPr lang="en-US" dirty="0"/>
+          </a:p>
+        </p:txBody>
+      </p:sp>
+      <p:sp>
+        <p:nvSpPr>
+          <p:cNvPr id="13" name="TextBox 12">
+            <a:extLst>
+              <a:ext uri="{FF2B5EF4-FFF2-40B4-BE49-F238E27FC236}">
+                <a16:creationId xmlns:a16="http://schemas.microsoft.com/office/drawing/2014/main" id="{82F6A4E5-2389-4F57-A314-672306399CE6}"/>
+              </a:ext>
+            </a:extLst>
+          </p:cNvPr>
+          <p:cNvSpPr txBox="1"/>
+          <p:nvPr/>
+        </p:nvSpPr>
+        <p:spPr>
+          <a:xfrm>
+            <a:off x="3665912" y="6123651"/>
+            <a:ext cx="5203767" cy="369332"/>
+          </a:xfrm>
+          <a:prstGeom prst="rect">
+            <a:avLst/>
+          </a:prstGeom>
+          <a:noFill/>
+        </p:spPr>
+        <p:txBody>
+          <a:bodyPr wrap="square" rtlCol="0">
+            <a:spAutoFit/>
+          </a:bodyPr>
+          <a:lstStyle/>
+          <a:p>
+            <a:r>
+              <a:rPr lang="en-US" dirty="0"/>
+              <a:t>Backdrop = </a:t>
+            </a:r>
+            <a:r>
+              <a:rPr lang="en-US" dirty="0">
+                <a:hlinkClick r:id="rId3"/>
+              </a:rPr>
+              <a:t>https://startbootstrap.com/themes/</a:t>
+            </a:r>
             <a:endParaRPr lang="en-US" dirty="0"/>
           </a:p>
         </p:txBody>

</xml_diff>